<commit_message>
Whiteboard drawings from lectures as separate files.
</commit_message>
<xml_diff>
--- a/slides/da2020-lecture-09.pptx
+++ b/slides/da2020-lecture-09.pptx
@@ -5,10 +5,10 @@
     <p:sldMasterId id="2147483648" r:id="rId1"/>
   </p:sldMasterIdLst>
   <p:notesMasterIdLst>
-    <p:notesMasterId r:id="rId11"/>
+    <p:notesMasterId r:id="rId8"/>
   </p:notesMasterIdLst>
   <p:handoutMasterIdLst>
-    <p:handoutMasterId r:id="rId12"/>
+    <p:handoutMasterId r:id="rId9"/>
   </p:handoutMasterIdLst>
   <p:sldIdLst>
     <p:sldId id="258" r:id="rId2"/>
@@ -16,10 +16,7 @@
     <p:sldId id="266" r:id="rId4"/>
     <p:sldId id="265" r:id="rId5"/>
     <p:sldId id="259" r:id="rId6"/>
-    <p:sldId id="262" r:id="rId7"/>
-    <p:sldId id="261" r:id="rId8"/>
-    <p:sldId id="263" r:id="rId9"/>
-    <p:sldId id="267" r:id="rId10"/>
+    <p:sldId id="261" r:id="rId7"/>
   </p:sldIdLst>
   <p:sldSz cx="12192000" cy="6858000"/>
   <p:notesSz cx="6858000" cy="9144000"/>
@@ -246,7 +243,7 @@
           <a:p>
             <a:fld id="{24EFFC9C-04E4-E646-9E5F-B16BB383ECF2}" type="datetimeFigureOut">
               <a:rPr lang="en-US" smtClean="0"/>
-              <a:t>11/10/20</a:t>
+              <a:t>12/10/20</a:t>
             </a:fld>
             <a:endParaRPr lang="en-US"/>
           </a:p>
@@ -423,7 +420,7 @@
           <a:p>
             <a:fld id="{71795A92-54D0-5E4B-A08D-97789E42C8EA}" type="datetimeFigureOut">
               <a:rPr lang="en-US" smtClean="0"/>
-              <a:t>11/10/20</a:t>
+              <a:t>12/10/20</a:t>
             </a:fld>
             <a:endParaRPr lang="en-US"/>
           </a:p>
@@ -925,7 +922,7 @@
           <a:p>
             <a:fld id="{D1D074E6-BC95-7A40-8145-5D6390B81855}" type="datetimeFigureOut">
               <a:rPr lang="en-US" smtClean="0"/>
-              <a:t>11/10/20</a:t>
+              <a:t>12/10/20</a:t>
             </a:fld>
             <a:endParaRPr lang="en-US"/>
           </a:p>
@@ -1123,7 +1120,7 @@
           <a:p>
             <a:fld id="{D1D074E6-BC95-7A40-8145-5D6390B81855}" type="datetimeFigureOut">
               <a:rPr lang="en-US" smtClean="0"/>
-              <a:t>11/10/20</a:t>
+              <a:t>12/10/20</a:t>
             </a:fld>
             <a:endParaRPr lang="en-US"/>
           </a:p>
@@ -1331,7 +1328,7 @@
           <a:p>
             <a:fld id="{D1D074E6-BC95-7A40-8145-5D6390B81855}" type="datetimeFigureOut">
               <a:rPr lang="en-US" smtClean="0"/>
-              <a:t>11/10/20</a:t>
+              <a:t>12/10/20</a:t>
             </a:fld>
             <a:endParaRPr lang="en-US"/>
           </a:p>
@@ -1536,7 +1533,7 @@
           <a:p>
             <a:fld id="{D1D074E6-BC95-7A40-8145-5D6390B81855}" type="datetimeFigureOut">
               <a:rPr lang="en-US" smtClean="0"/>
-              <a:t>11/10/20</a:t>
+              <a:t>12/10/20</a:t>
             </a:fld>
             <a:endParaRPr lang="en-US"/>
           </a:p>
@@ -1689,7 +1686,7 @@
           <a:p>
             <a:fld id="{D1D074E6-BC95-7A40-8145-5D6390B81855}" type="datetimeFigureOut">
               <a:rPr lang="en-US" smtClean="0"/>
-              <a:t>11/10/20</a:t>
+              <a:t>12/10/20</a:t>
             </a:fld>
             <a:endParaRPr lang="en-US"/>
           </a:p>
@@ -1954,7 +1951,7 @@
           <a:p>
             <a:fld id="{D1D074E6-BC95-7A40-8145-5D6390B81855}" type="datetimeFigureOut">
               <a:rPr lang="en-US" smtClean="0"/>
-              <a:t>11/10/20</a:t>
+              <a:t>12/10/20</a:t>
             </a:fld>
             <a:endParaRPr lang="en-US"/>
           </a:p>
@@ -2366,7 +2363,7 @@
           <a:p>
             <a:fld id="{D1D074E6-BC95-7A40-8145-5D6390B81855}" type="datetimeFigureOut">
               <a:rPr lang="en-US" smtClean="0"/>
-              <a:t>11/10/20</a:t>
+              <a:t>12/10/20</a:t>
             </a:fld>
             <a:endParaRPr lang="en-US"/>
           </a:p>
@@ -2507,7 +2504,7 @@
           <a:p>
             <a:fld id="{D1D074E6-BC95-7A40-8145-5D6390B81855}" type="datetimeFigureOut">
               <a:rPr lang="en-US" smtClean="0"/>
-              <a:t>11/10/20</a:t>
+              <a:t>12/10/20</a:t>
             </a:fld>
             <a:endParaRPr lang="en-US"/>
           </a:p>
@@ -2620,7 +2617,7 @@
           <a:p>
             <a:fld id="{D1D074E6-BC95-7A40-8145-5D6390B81855}" type="datetimeFigureOut">
               <a:rPr lang="en-US" smtClean="0"/>
-              <a:t>11/10/20</a:t>
+              <a:t>12/10/20</a:t>
             </a:fld>
             <a:endParaRPr lang="en-US"/>
           </a:p>
@@ -2931,7 +2928,7 @@
           <a:p>
             <a:fld id="{D1D074E6-BC95-7A40-8145-5D6390B81855}" type="datetimeFigureOut">
               <a:rPr lang="en-US" smtClean="0"/>
-              <a:t>11/10/20</a:t>
+              <a:t>12/10/20</a:t>
             </a:fld>
             <a:endParaRPr lang="en-US"/>
           </a:p>
@@ -3219,7 +3216,7 @@
           <a:p>
             <a:fld id="{D1D074E6-BC95-7A40-8145-5D6390B81855}" type="datetimeFigureOut">
               <a:rPr lang="en-US" smtClean="0"/>
-              <a:t>11/10/20</a:t>
+              <a:t>12/10/20</a:t>
             </a:fld>
             <a:endParaRPr lang="en-US"/>
           </a:p>
@@ -3460,7 +3457,7 @@
           <a:p>
             <a:fld id="{D1D074E6-BC95-7A40-8145-5D6390B81855}" type="datetimeFigureOut">
               <a:rPr lang="en-US" smtClean="0"/>
-              <a:t>11/10/20</a:t>
+              <a:t>12/10/20</a:t>
             </a:fld>
             <a:endParaRPr lang="en-US"/>
           </a:p>
@@ -5378,66 +5375,6 @@
       </p:grpSpPr>
       <p:pic>
         <p:nvPicPr>
-          <p:cNvPr id="3" name="Picture 2">
-            <a:extLst>
-              <a:ext uri="{FF2B5EF4-FFF2-40B4-BE49-F238E27FC236}">
-                <a16:creationId xmlns:a16="http://schemas.microsoft.com/office/drawing/2014/main" id="{059C271E-5292-9043-ACC9-A261F478F032}"/>
-              </a:ext>
-            </a:extLst>
-          </p:cNvPr>
-          <p:cNvPicPr>
-            <a:picLocks noChangeAspect="1"/>
-          </p:cNvPicPr>
-          <p:nvPr/>
-        </p:nvPicPr>
-        <p:blipFill>
-          <a:blip r:embed="rId2"/>
-          <a:stretch>
-            <a:fillRect/>
-          </a:stretch>
-        </p:blipFill>
-        <p:spPr>
-          <a:xfrm>
-            <a:off x="-1200" y="-5385600"/>
-            <a:ext cx="12193200" cy="17456452"/>
-          </a:xfrm>
-          <a:prstGeom prst="rect">
-            <a:avLst/>
-          </a:prstGeom>
-        </p:spPr>
-      </p:pic>
-    </p:spTree>
-    <p:extLst>
-      <p:ext uri="{BB962C8B-B14F-4D97-AF65-F5344CB8AC3E}">
-        <p14:creationId xmlns:p14="http://schemas.microsoft.com/office/powerpoint/2010/main" val="2429885986"/>
-      </p:ext>
-    </p:extLst>
-  </p:cSld>
-  <p:clrMapOvr>
-    <a:masterClrMapping/>
-  </p:clrMapOvr>
-</p:sld>
-</file>
-
-<file path=ppt/slides/slide7.xml><?xml version="1.0" encoding="utf-8"?>
-<p:sld xmlns:a="http://schemas.openxmlformats.org/drawingml/2006/main" xmlns:r="http://schemas.openxmlformats.org/officeDocument/2006/relationships" xmlns:p="http://schemas.openxmlformats.org/presentationml/2006/main">
-  <p:cSld>
-    <p:spTree>
-      <p:nvGrpSpPr>
-        <p:cNvPr id="1" name=""/>
-        <p:cNvGrpSpPr/>
-        <p:nvPr/>
-      </p:nvGrpSpPr>
-      <p:grpSpPr>
-        <a:xfrm>
-          <a:off x="0" y="0"/>
-          <a:ext cx="0" cy="0"/>
-          <a:chOff x="0" y="0"/>
-          <a:chExt cx="0" cy="0"/>
-        </a:xfrm>
-      </p:grpSpPr>
-      <p:pic>
-        <p:nvPicPr>
           <p:cNvPr id="2" name="Picture 1">
             <a:extLst>
               <a:ext uri="{FF2B5EF4-FFF2-40B4-BE49-F238E27FC236}">
@@ -5470,126 +5407,6 @@
     <p:extLst>
       <p:ext uri="{BB962C8B-B14F-4D97-AF65-F5344CB8AC3E}">
         <p14:creationId xmlns:p14="http://schemas.microsoft.com/office/powerpoint/2010/main" val="1799951207"/>
-      </p:ext>
-    </p:extLst>
-  </p:cSld>
-  <p:clrMapOvr>
-    <a:masterClrMapping/>
-  </p:clrMapOvr>
-</p:sld>
-</file>
-
-<file path=ppt/slides/slide8.xml><?xml version="1.0" encoding="utf-8"?>
-<p:sld xmlns:a="http://schemas.openxmlformats.org/drawingml/2006/main" xmlns:r="http://schemas.openxmlformats.org/officeDocument/2006/relationships" xmlns:p="http://schemas.openxmlformats.org/presentationml/2006/main">
-  <p:cSld>
-    <p:spTree>
-      <p:nvGrpSpPr>
-        <p:cNvPr id="1" name=""/>
-        <p:cNvGrpSpPr/>
-        <p:nvPr/>
-      </p:nvGrpSpPr>
-      <p:grpSpPr>
-        <a:xfrm>
-          <a:off x="0" y="0"/>
-          <a:ext cx="0" cy="0"/>
-          <a:chOff x="0" y="0"/>
-          <a:chExt cx="0" cy="0"/>
-        </a:xfrm>
-      </p:grpSpPr>
-      <p:pic>
-        <p:nvPicPr>
-          <p:cNvPr id="3" name="Picture 2">
-            <a:extLst>
-              <a:ext uri="{FF2B5EF4-FFF2-40B4-BE49-F238E27FC236}">
-                <a16:creationId xmlns:a16="http://schemas.microsoft.com/office/drawing/2014/main" id="{31CA34C1-2359-9B4D-8A35-4919299820C1}"/>
-              </a:ext>
-            </a:extLst>
-          </p:cNvPr>
-          <p:cNvPicPr>
-            <a:picLocks noChangeAspect="1"/>
-          </p:cNvPicPr>
-          <p:nvPr/>
-        </p:nvPicPr>
-        <p:blipFill>
-          <a:blip r:embed="rId2"/>
-          <a:stretch>
-            <a:fillRect/>
-          </a:stretch>
-        </p:blipFill>
-        <p:spPr>
-          <a:xfrm>
-            <a:off x="0" y="-5385600"/>
-            <a:ext cx="12193200" cy="17456453"/>
-          </a:xfrm>
-          <a:prstGeom prst="rect">
-            <a:avLst/>
-          </a:prstGeom>
-        </p:spPr>
-      </p:pic>
-    </p:spTree>
-    <p:extLst>
-      <p:ext uri="{BB962C8B-B14F-4D97-AF65-F5344CB8AC3E}">
-        <p14:creationId xmlns:p14="http://schemas.microsoft.com/office/powerpoint/2010/main" val="696635270"/>
-      </p:ext>
-    </p:extLst>
-  </p:cSld>
-  <p:clrMapOvr>
-    <a:masterClrMapping/>
-  </p:clrMapOvr>
-</p:sld>
-</file>
-
-<file path=ppt/slides/slide9.xml><?xml version="1.0" encoding="utf-8"?>
-<p:sld xmlns:a="http://schemas.openxmlformats.org/drawingml/2006/main" xmlns:r="http://schemas.openxmlformats.org/officeDocument/2006/relationships" xmlns:p="http://schemas.openxmlformats.org/presentationml/2006/main">
-  <p:cSld>
-    <p:spTree>
-      <p:nvGrpSpPr>
-        <p:cNvPr id="1" name=""/>
-        <p:cNvGrpSpPr/>
-        <p:nvPr/>
-      </p:nvGrpSpPr>
-      <p:grpSpPr>
-        <a:xfrm>
-          <a:off x="0" y="0"/>
-          <a:ext cx="0" cy="0"/>
-          <a:chOff x="0" y="0"/>
-          <a:chExt cx="0" cy="0"/>
-        </a:xfrm>
-      </p:grpSpPr>
-      <p:pic>
-        <p:nvPicPr>
-          <p:cNvPr id="3" name="Picture 2">
-            <a:extLst>
-              <a:ext uri="{FF2B5EF4-FFF2-40B4-BE49-F238E27FC236}">
-                <a16:creationId xmlns:a16="http://schemas.microsoft.com/office/drawing/2014/main" id="{E1405412-CEFD-5F47-A632-2CB4E02FF9C5}"/>
-              </a:ext>
-            </a:extLst>
-          </p:cNvPr>
-          <p:cNvPicPr>
-            <a:picLocks noChangeAspect="1"/>
-          </p:cNvPicPr>
-          <p:nvPr/>
-        </p:nvPicPr>
-        <p:blipFill>
-          <a:blip r:embed="rId2"/>
-          <a:stretch>
-            <a:fillRect/>
-          </a:stretch>
-        </p:blipFill>
-        <p:spPr>
-          <a:xfrm>
-            <a:off x="-1" y="-5385600"/>
-            <a:ext cx="12193200" cy="17456453"/>
-          </a:xfrm>
-          <a:prstGeom prst="rect">
-            <a:avLst/>
-          </a:prstGeom>
-        </p:spPr>
-      </p:pic>
-    </p:spTree>
-    <p:extLst>
-      <p:ext uri="{BB962C8B-B14F-4D97-AF65-F5344CB8AC3E}">
-        <p14:creationId xmlns:p14="http://schemas.microsoft.com/office/powerpoint/2010/main" val="3541791991"/>
       </p:ext>
     </p:extLst>
   </p:cSld>

</xml_diff>